<commit_message>
update mainwindows and Nunit, UITest code
</commit_message>
<xml_diff>
--- a/Stock trade and analyst system.pptx
+++ b/Stock trade and analyst system.pptx
@@ -118,6 +118,22 @@
       </a:defRPr>
     </a:lvl9pPr>
   </p:defaultTextStyle>
+  <p:extLst>
+    <p:ext uri="{EFAFB233-063F-42B5-8137-9DF3F51BA10A}">
+      <p15:sldGuideLst xmlns:p15="http://schemas.microsoft.com/office/powerpoint/2012/main">
+        <p15:guide id="1" orient="horz" pos="2160">
+          <p15:clr>
+            <a:srgbClr val="A4A3A4"/>
+          </p15:clr>
+        </p15:guide>
+        <p15:guide id="2" pos="2880">
+          <p15:clr>
+            <a:srgbClr val="A4A3A4"/>
+          </p15:clr>
+        </p15:guide>
+      </p15:sldGuideLst>
+    </p:ext>
+  </p:extLst>
 </p:presentation>
 </file>
 
@@ -3919,11 +3935,7 @@
             </a:pPr>
             <a:r>
               <a:rPr lang="en-CA" sz="3600" b="1" dirty="0" smtClean="0"/>
-              <a:t>Background</a:t>
-            </a:r>
-            <a:r>
-              <a:rPr lang="en-CA" sz="3600" b="1" dirty="0" smtClean="0"/>
-              <a:t>:</a:t>
+              <a:t>Background:</a:t>
             </a:r>
           </a:p>
           <a:p>
@@ -4068,32 +4080,56 @@
       </p:grpSpPr>
       <p:sp>
         <p:nvSpPr>
-          <p:cNvPr id="3" name="Content Placeholder 2"/>
-          <p:cNvSpPr>
-            <a:spLocks noGrp="1"/>
-          </p:cNvSpPr>
-          <p:nvPr>
-            <p:ph idx="1"/>
-          </p:nvPr>
-        </p:nvSpPr>
+          <p:cNvPr id="4" name="Title 3"/>
+          <p:cNvSpPr>
+            <a:spLocks noGrp="1"/>
+          </p:cNvSpPr>
+          <p:nvPr>
+            <p:ph type="title"/>
+          </p:nvPr>
+        </p:nvSpPr>
+        <p:spPr/>
+        <p:txBody>
+          <a:bodyPr>
+            <a:normAutofit/>
+          </a:bodyPr>
+          <a:lstStyle/>
+          <a:p>
+            <a:pPr algn="l"/>
+            <a:r>
+              <a:rPr lang="en-US" sz="3600" dirty="0" smtClean="0"/>
+              <a:t>GUI:</a:t>
+            </a:r>
+            <a:endParaRPr lang="en-US" sz="3600" dirty="0"/>
+          </a:p>
+        </p:txBody>
+      </p:sp>
+      <p:pic>
+        <p:nvPicPr>
+          <p:cNvPr id="2" name="Content Placeholder 1"/>
+          <p:cNvPicPr>
+            <a:picLocks noGrp="1" noChangeAspect="1"/>
+          </p:cNvPicPr>
+          <p:nvPr>
+            <p:ph idx="4294967295"/>
+          </p:nvPr>
+        </p:nvPicPr>
+        <p:blipFill>
+          <a:blip r:embed="rId2"/>
+          <a:stretch>
+            <a:fillRect/>
+          </a:stretch>
+        </p:blipFill>
         <p:spPr>
           <a:xfrm>
-            <a:off x="457200" y="404664"/>
-            <a:ext cx="8229600" cy="5721499"/>
+            <a:off x="-15875" y="1857375"/>
+            <a:ext cx="9159875" cy="4994275"/>
           </a:xfrm>
+          <a:prstGeom prst="rect">
+            <a:avLst/>
+          </a:prstGeom>
         </p:spPr>
-        <p:txBody>
-          <a:bodyPr/>
-          <a:lstStyle/>
-          <a:p>
-            <a:r>
-              <a:rPr lang="en-CA" dirty="0" smtClean="0"/>
-              <a:t>Screen shot main window</a:t>
-            </a:r>
-            <a:endParaRPr lang="en-CA" dirty="0"/>
-          </a:p>
-        </p:txBody>
-      </p:sp>
+      </p:pic>
     </p:spTree>
     <p:extLst>
       <p:ext uri="{BB962C8B-B14F-4D97-AF65-F5344CB8AC3E}">
@@ -4447,6 +4483,22 @@
               <a:rPr lang="en-CA" dirty="0" smtClean="0"/>
               <a:t>    check quantity and cost by stock ticker </a:t>
             </a:r>
+            <a:endParaRPr lang="en-CA" dirty="0"/>
+          </a:p>
+          <a:p>
+            <a:pPr marL="0" indent="0">
+              <a:buNone/>
+            </a:pPr>
+            <a:r>
+              <a:rPr lang="en-CA" dirty="0" smtClean="0"/>
+              <a:t>    write the right query without extra data.</a:t>
+            </a:r>
+          </a:p>
+          <a:p>
+            <a:pPr marL="0" indent="0">
+              <a:buNone/>
+            </a:pPr>
+            <a:endParaRPr lang="en-CA" dirty="0" smtClean="0"/>
           </a:p>
           <a:p>
             <a:pPr marL="0" indent="0">
@@ -4456,6 +4508,11 @@
               <a:rPr lang="en-CA" dirty="0" smtClean="0"/>
               <a:t>    Set action buy=1, sell=-1 </a:t>
             </a:r>
+            <a:r>
+              <a:rPr lang="en-CA" dirty="0" smtClean="0"/>
+              <a:t>, none = 0</a:t>
+            </a:r>
+            <a:endParaRPr lang="en-CA" dirty="0" smtClean="0"/>
           </a:p>
         </p:txBody>
       </p:sp>
@@ -4522,18 +4579,10 @@
               <a:buNone/>
             </a:pPr>
             <a:r>
-              <a:rPr lang="en-CA" dirty="0" smtClean="0"/>
-              <a:t>    check quantity and cost by stock ticker </a:t>
-            </a:r>
-          </a:p>
-          <a:p>
-            <a:pPr marL="0" indent="0">
-              <a:buNone/>
-            </a:pPr>
-            <a:r>
-              <a:rPr lang="en-CA" dirty="0" smtClean="0"/>
-              <a:t>    Set action buy=1, sell=-1 </a:t>
-            </a:r>
+              <a:rPr lang="en-CA" smtClean="0"/>
+              <a:t>    </a:t>
+            </a:r>
+            <a:endParaRPr lang="en-CA" dirty="0" smtClean="0"/>
           </a:p>
         </p:txBody>
       </p:sp>

</xml_diff>